<commit_message>
Add Databricks ref diagrams
</commit_message>
<xml_diff>
--- a/warner-databricks-slides.pptx
+++ b/warner-databricks-slides.pptx
@@ -5,7 +5,7 @@
     <p:sldMasterId id="2147483648" r:id="rId1"/>
   </p:sldMasterIdLst>
   <p:notesMasterIdLst>
-    <p:notesMasterId r:id="rId15"/>
+    <p:notesMasterId r:id="rId18"/>
   </p:notesMasterIdLst>
   <p:sldIdLst>
     <p:sldId id="257" r:id="rId2"/>
@@ -20,7 +20,10 @@
     <p:sldId id="2134805737" r:id="rId11"/>
     <p:sldId id="2134805738" r:id="rId12"/>
     <p:sldId id="2134805731" r:id="rId13"/>
-    <p:sldId id="2134805739" r:id="rId14"/>
+    <p:sldId id="2134805746" r:id="rId14"/>
+    <p:sldId id="2134805747" r:id="rId15"/>
+    <p:sldId id="2134805748" r:id="rId16"/>
+    <p:sldId id="2134805739" r:id="rId17"/>
   </p:sldIdLst>
   <p:sldSz cx="9144000" cy="5143500" type="screen16x9"/>
   <p:notesSz cx="6858000" cy="9144000"/>
@@ -6328,6 +6331,623 @@
           <p:cNvPr id="2" name="Title 1">
             <a:extLst>
               <a:ext uri="{FF2B5EF4-FFF2-40B4-BE49-F238E27FC236}">
+                <a16:creationId xmlns:a16="http://schemas.microsoft.com/office/drawing/2014/main" id="{28837941-31DF-111A-672B-45A257422520}"/>
+              </a:ext>
+            </a:extLst>
+          </p:cNvPr>
+          <p:cNvSpPr>
+            <a:spLocks noGrp="1"/>
+          </p:cNvSpPr>
+          <p:nvPr>
+            <p:ph type="title"/>
+          </p:nvPr>
+        </p:nvSpPr>
+        <p:spPr/>
+        <p:txBody>
+          <a:bodyPr/>
+          <a:lstStyle/>
+          <a:p>
+            <a:r>
+              <a:rPr lang="en-US" dirty="0"/>
+              <a:t>Databricks CLI</a:t>
+            </a:r>
+          </a:p>
+        </p:txBody>
+      </p:sp>
+      <p:sp>
+        <p:nvSpPr>
+          <p:cNvPr id="4" name="Content Placeholder 3">
+            <a:extLst>
+              <a:ext uri="{FF2B5EF4-FFF2-40B4-BE49-F238E27FC236}">
+                <a16:creationId xmlns:a16="http://schemas.microsoft.com/office/drawing/2014/main" id="{879F8F80-D581-F68B-617C-332764D6D7FC}"/>
+              </a:ext>
+            </a:extLst>
+          </p:cNvPr>
+          <p:cNvSpPr>
+            <a:spLocks noGrp="1"/>
+          </p:cNvSpPr>
+          <p:nvPr>
+            <p:ph idx="1"/>
+          </p:nvPr>
+        </p:nvSpPr>
+        <p:spPr>
+          <a:xfrm>
+            <a:off x="1541417" y="556576"/>
+            <a:ext cx="7210696" cy="3547021"/>
+          </a:xfrm>
+        </p:spPr>
+        <p:txBody>
+          <a:bodyPr/>
+          <a:lstStyle/>
+          <a:p>
+            <a:pPr marL="0" indent="0">
+              <a:buNone/>
+            </a:pPr>
+            <a:r>
+              <a:rPr lang="en-US" sz="1200" dirty="0">
+                <a:latin typeface="Roboto Mono" pitchFamily="2" charset="0"/>
+                <a:ea typeface="Roboto Mono" pitchFamily="2" charset="0"/>
+              </a:rPr>
+              <a:t># Install the CLI</a:t>
+            </a:r>
+          </a:p>
+          <a:p>
+            <a:pPr marL="0" indent="0">
+              <a:buNone/>
+            </a:pPr>
+            <a:r>
+              <a:rPr lang="en-US" sz="1200" dirty="0">
+                <a:latin typeface="Roboto Mono" pitchFamily="2" charset="0"/>
+                <a:ea typeface="Roboto Mono" pitchFamily="2" charset="0"/>
+              </a:rPr>
+              <a:t>pip install </a:t>
+            </a:r>
+            <a:r>
+              <a:rPr lang="en-US" sz="1200" dirty="0" err="1">
+                <a:latin typeface="Roboto Mono" pitchFamily="2" charset="0"/>
+                <a:ea typeface="Roboto Mono" pitchFamily="2" charset="0"/>
+              </a:rPr>
+              <a:t>databricks</a:t>
+            </a:r>
+            <a:r>
+              <a:rPr lang="en-US" sz="1200" dirty="0">
+                <a:latin typeface="Roboto Mono" pitchFamily="2" charset="0"/>
+                <a:ea typeface="Roboto Mono" pitchFamily="2" charset="0"/>
+              </a:rPr>
+              <a:t>-cli</a:t>
+            </a:r>
+          </a:p>
+          <a:p>
+            <a:pPr marL="0" indent="0">
+              <a:buNone/>
+            </a:pPr>
+            <a:endParaRPr lang="en-US" sz="1200" dirty="0">
+              <a:latin typeface="Roboto Mono" pitchFamily="2" charset="0"/>
+              <a:ea typeface="Roboto Mono" pitchFamily="2" charset="0"/>
+            </a:endParaRPr>
+          </a:p>
+          <a:p>
+            <a:pPr marL="0" indent="0">
+              <a:buNone/>
+            </a:pPr>
+            <a:r>
+              <a:rPr lang="en-US" sz="1200" dirty="0">
+                <a:latin typeface="Roboto Mono" pitchFamily="2" charset="0"/>
+                <a:ea typeface="Roboto Mono" pitchFamily="2" charset="0"/>
+              </a:rPr>
+              <a:t># Authenticate to Databricks host</a:t>
+            </a:r>
+          </a:p>
+          <a:p>
+            <a:pPr marL="0" indent="0">
+              <a:buNone/>
+            </a:pPr>
+            <a:r>
+              <a:rPr lang="en-US" sz="1200" dirty="0" err="1">
+                <a:latin typeface="Roboto Mono" pitchFamily="2" charset="0"/>
+                <a:ea typeface="Roboto Mono" pitchFamily="2" charset="0"/>
+              </a:rPr>
+              <a:t>databricks</a:t>
+            </a:r>
+            <a:r>
+              <a:rPr lang="en-US" sz="1200" dirty="0">
+                <a:latin typeface="Roboto Mono" pitchFamily="2" charset="0"/>
+                <a:ea typeface="Roboto Mono" pitchFamily="2" charset="0"/>
+              </a:rPr>
+              <a:t> configure --token</a:t>
+            </a:r>
+          </a:p>
+          <a:p>
+            <a:pPr marL="0" indent="0">
+              <a:buNone/>
+            </a:pPr>
+            <a:endParaRPr lang="en-US" sz="1200" dirty="0">
+              <a:latin typeface="Roboto Mono" pitchFamily="2" charset="0"/>
+              <a:ea typeface="Roboto Mono" pitchFamily="2" charset="0"/>
+            </a:endParaRPr>
+          </a:p>
+          <a:p>
+            <a:pPr marL="0" indent="0">
+              <a:buNone/>
+            </a:pPr>
+            <a:r>
+              <a:rPr lang="en-US" sz="1200" dirty="0">
+                <a:latin typeface="Roboto Mono" pitchFamily="2" charset="0"/>
+                <a:ea typeface="Roboto Mono" pitchFamily="2" charset="0"/>
+              </a:rPr>
+              <a:t># List available clusters</a:t>
+            </a:r>
+          </a:p>
+          <a:p>
+            <a:pPr marL="0" indent="0">
+              <a:buNone/>
+            </a:pPr>
+            <a:r>
+              <a:rPr lang="en-US" sz="1200" dirty="0" err="1">
+                <a:latin typeface="Roboto Mono" pitchFamily="2" charset="0"/>
+                <a:ea typeface="Roboto Mono" pitchFamily="2" charset="0"/>
+              </a:rPr>
+              <a:t>databricks</a:t>
+            </a:r>
+            <a:r>
+              <a:rPr lang="en-US" sz="1200" dirty="0">
+                <a:latin typeface="Roboto Mono" pitchFamily="2" charset="0"/>
+                <a:ea typeface="Roboto Mono" pitchFamily="2" charset="0"/>
+              </a:rPr>
+              <a:t> clusters list</a:t>
+            </a:r>
+          </a:p>
+          <a:p>
+            <a:pPr marL="0" indent="0">
+              <a:buNone/>
+            </a:pPr>
+            <a:endParaRPr lang="en-US" sz="1200" dirty="0">
+              <a:latin typeface="Roboto Mono" pitchFamily="2" charset="0"/>
+              <a:ea typeface="Roboto Mono" pitchFamily="2" charset="0"/>
+            </a:endParaRPr>
+          </a:p>
+          <a:p>
+            <a:pPr marL="0" indent="0">
+              <a:buNone/>
+            </a:pPr>
+            <a:r>
+              <a:rPr lang="en-US" sz="1200" dirty="0">
+                <a:latin typeface="Roboto Mono" pitchFamily="2" charset="0"/>
+                <a:ea typeface="Roboto Mono" pitchFamily="2" charset="0"/>
+              </a:rPr>
+              <a:t># Create a new cluster</a:t>
+            </a:r>
+          </a:p>
+          <a:p>
+            <a:pPr marL="0" indent="0">
+              <a:buNone/>
+            </a:pPr>
+            <a:r>
+              <a:rPr lang="en-US" sz="1200" dirty="0" err="1">
+                <a:latin typeface="Roboto Mono" pitchFamily="2" charset="0"/>
+                <a:ea typeface="Roboto Mono" pitchFamily="2" charset="0"/>
+              </a:rPr>
+              <a:t>databricks</a:t>
+            </a:r>
+            <a:r>
+              <a:rPr lang="en-US" sz="1200" dirty="0">
+                <a:latin typeface="Roboto Mono" pitchFamily="2" charset="0"/>
+                <a:ea typeface="Roboto Mono" pitchFamily="2" charset="0"/>
+              </a:rPr>
+              <a:t> clusters create --</a:t>
+            </a:r>
+            <a:r>
+              <a:rPr lang="en-US" sz="1200" dirty="0" err="1">
+                <a:latin typeface="Roboto Mono" pitchFamily="2" charset="0"/>
+                <a:ea typeface="Roboto Mono" pitchFamily="2" charset="0"/>
+              </a:rPr>
+              <a:t>json</a:t>
+            </a:r>
+            <a:r>
+              <a:rPr lang="en-US" sz="1200" dirty="0">
+                <a:latin typeface="Roboto Mono" pitchFamily="2" charset="0"/>
+                <a:ea typeface="Roboto Mono" pitchFamily="2" charset="0"/>
+              </a:rPr>
+              <a:t>-file=create-</a:t>
+            </a:r>
+            <a:r>
+              <a:rPr lang="en-US" sz="1200" dirty="0" err="1">
+                <a:latin typeface="Roboto Mono" pitchFamily="2" charset="0"/>
+                <a:ea typeface="Roboto Mono" pitchFamily="2" charset="0"/>
+              </a:rPr>
+              <a:t>cluster.json</a:t>
+            </a:r>
+            <a:endParaRPr lang="en-US" sz="1200" dirty="0">
+              <a:latin typeface="Roboto Mono" pitchFamily="2" charset="0"/>
+              <a:ea typeface="Roboto Mono" pitchFamily="2" charset="0"/>
+            </a:endParaRPr>
+          </a:p>
+          <a:p>
+            <a:pPr marL="0" indent="0">
+              <a:buNone/>
+            </a:pPr>
+            <a:endParaRPr lang="en-US" sz="1200" dirty="0">
+              <a:latin typeface="Roboto Mono" pitchFamily="2" charset="0"/>
+              <a:ea typeface="Roboto Mono" pitchFamily="2" charset="0"/>
+            </a:endParaRPr>
+          </a:p>
+          <a:p>
+            <a:pPr marL="0" indent="0">
+              <a:buNone/>
+            </a:pPr>
+            <a:r>
+              <a:rPr lang="en-US" sz="1200" dirty="0">
+                <a:latin typeface="Roboto Mono" pitchFamily="2" charset="0"/>
+                <a:ea typeface="Roboto Mono" pitchFamily="2" charset="0"/>
+              </a:rPr>
+              <a:t># List available jobs</a:t>
+            </a:r>
+          </a:p>
+          <a:p>
+            <a:pPr marL="0" indent="0">
+              <a:buNone/>
+            </a:pPr>
+            <a:r>
+              <a:rPr lang="en-US" sz="1200" dirty="0" err="1">
+                <a:latin typeface="Roboto Mono" pitchFamily="2" charset="0"/>
+                <a:ea typeface="Roboto Mono" pitchFamily="2" charset="0"/>
+              </a:rPr>
+              <a:t>databricks</a:t>
+            </a:r>
+            <a:r>
+              <a:rPr lang="en-US" sz="1200" dirty="0">
+                <a:latin typeface="Roboto Mono" pitchFamily="2" charset="0"/>
+                <a:ea typeface="Roboto Mono" pitchFamily="2" charset="0"/>
+              </a:rPr>
+              <a:t> jobs list</a:t>
+            </a:r>
+          </a:p>
+          <a:p>
+            <a:pPr marL="0" indent="0">
+              <a:buNone/>
+            </a:pPr>
+            <a:endParaRPr lang="en-US" sz="1200" dirty="0">
+              <a:latin typeface="Roboto Mono" pitchFamily="2" charset="0"/>
+              <a:ea typeface="Roboto Mono" pitchFamily="2" charset="0"/>
+            </a:endParaRPr>
+          </a:p>
+          <a:p>
+            <a:pPr marL="0" indent="0">
+              <a:buNone/>
+            </a:pPr>
+            <a:r>
+              <a:rPr lang="en-US" sz="1200" dirty="0">
+                <a:latin typeface="Roboto Mono" pitchFamily="2" charset="0"/>
+                <a:ea typeface="Roboto Mono" pitchFamily="2" charset="0"/>
+              </a:rPr>
+              <a:t># Run a job</a:t>
+            </a:r>
+          </a:p>
+          <a:p>
+            <a:pPr marL="0" indent="0">
+              <a:buNone/>
+            </a:pPr>
+            <a:r>
+              <a:rPr lang="en-US" sz="1200" dirty="0" err="1">
+                <a:latin typeface="Roboto Mono" pitchFamily="2" charset="0"/>
+                <a:ea typeface="Roboto Mono" pitchFamily="2" charset="0"/>
+              </a:rPr>
+              <a:t>databricks</a:t>
+            </a:r>
+            <a:r>
+              <a:rPr lang="en-US" sz="1200" dirty="0">
+                <a:latin typeface="Roboto Mono" pitchFamily="2" charset="0"/>
+                <a:ea typeface="Roboto Mono" pitchFamily="2" charset="0"/>
+              </a:rPr>
+              <a:t> jobs run-now --job-id &lt;job-id&gt;</a:t>
+            </a:r>
+          </a:p>
+          <a:p>
+            <a:pPr marL="0" indent="0">
+              <a:buNone/>
+            </a:pPr>
+            <a:endParaRPr lang="en-US" sz="1200" dirty="0">
+              <a:latin typeface="Roboto Mono" pitchFamily="2" charset="0"/>
+              <a:ea typeface="Roboto Mono" pitchFamily="2" charset="0"/>
+            </a:endParaRPr>
+          </a:p>
+          <a:p>
+            <a:pPr marL="0" indent="0">
+              <a:buNone/>
+            </a:pPr>
+            <a:r>
+              <a:rPr lang="en-US" sz="1200" dirty="0">
+                <a:latin typeface="Roboto Mono" pitchFamily="2" charset="0"/>
+                <a:ea typeface="Roboto Mono" pitchFamily="2" charset="0"/>
+              </a:rPr>
+              <a:t># Upload a file to DBFS (Databricks File System)</a:t>
+            </a:r>
+          </a:p>
+          <a:p>
+            <a:pPr marL="0" indent="0">
+              <a:buNone/>
+            </a:pPr>
+            <a:r>
+              <a:rPr lang="en-US" sz="1200" dirty="0" err="1">
+                <a:latin typeface="Roboto Mono" pitchFamily="2" charset="0"/>
+                <a:ea typeface="Roboto Mono" pitchFamily="2" charset="0"/>
+              </a:rPr>
+              <a:t>databricks</a:t>
+            </a:r>
+            <a:r>
+              <a:rPr lang="en-US" sz="1200" dirty="0">
+                <a:latin typeface="Roboto Mono" pitchFamily="2" charset="0"/>
+                <a:ea typeface="Roboto Mono" pitchFamily="2" charset="0"/>
+              </a:rPr>
+              <a:t> fs cp local-file-path </a:t>
+            </a:r>
+            <a:r>
+              <a:rPr lang="en-US" sz="1200" dirty="0" err="1">
+                <a:latin typeface="Roboto Mono" pitchFamily="2" charset="0"/>
+                <a:ea typeface="Roboto Mono" pitchFamily="2" charset="0"/>
+              </a:rPr>
+              <a:t>dbfs</a:t>
+            </a:r>
+            <a:r>
+              <a:rPr lang="en-US" sz="1200" dirty="0">
+                <a:latin typeface="Roboto Mono" pitchFamily="2" charset="0"/>
+                <a:ea typeface="Roboto Mono" pitchFamily="2" charset="0"/>
+              </a:rPr>
+              <a:t>:/destination-path</a:t>
+            </a:r>
+          </a:p>
+          <a:p>
+            <a:pPr marL="0" indent="0">
+              <a:buNone/>
+            </a:pPr>
+            <a:endParaRPr lang="en-US" sz="1200" dirty="0">
+              <a:latin typeface="Roboto Mono" pitchFamily="2" charset="0"/>
+              <a:ea typeface="Roboto Mono" pitchFamily="2" charset="0"/>
+            </a:endParaRPr>
+          </a:p>
+        </p:txBody>
+      </p:sp>
+    </p:spTree>
+    <p:extLst>
+      <p:ext uri="{BB962C8B-B14F-4D97-AF65-F5344CB8AC3E}">
+        <p14:creationId xmlns:p14="http://schemas.microsoft.com/office/powerpoint/2010/main" val="1652246716"/>
+      </p:ext>
+    </p:extLst>
+  </p:cSld>
+  <p:clrMapOvr>
+    <a:masterClrMapping/>
+  </p:clrMapOvr>
+</p:sld>
+</file>
+
+<file path=ppt/slides/slide14.xml><?xml version="1.0" encoding="utf-8"?>
+<p:sld xmlns:a="http://schemas.openxmlformats.org/drawingml/2006/main" xmlns:r="http://schemas.openxmlformats.org/officeDocument/2006/relationships" xmlns:p="http://schemas.openxmlformats.org/presentationml/2006/main">
+  <p:cSld>
+    <p:spTree>
+      <p:nvGrpSpPr>
+        <p:cNvPr id="1" name=""/>
+        <p:cNvGrpSpPr/>
+        <p:nvPr/>
+      </p:nvGrpSpPr>
+      <p:grpSpPr>
+        <a:xfrm>
+          <a:off x="0" y="0"/>
+          <a:ext cx="0" cy="0"/>
+          <a:chOff x="0" y="0"/>
+          <a:chExt cx="0" cy="0"/>
+        </a:xfrm>
+      </p:grpSpPr>
+      <p:sp>
+        <p:nvSpPr>
+          <p:cNvPr id="2" name="Title 1">
+            <a:extLst>
+              <a:ext uri="{FF2B5EF4-FFF2-40B4-BE49-F238E27FC236}">
+                <a16:creationId xmlns:a16="http://schemas.microsoft.com/office/drawing/2014/main" id="{28837941-31DF-111A-672B-45A257422520}"/>
+              </a:ext>
+            </a:extLst>
+          </p:cNvPr>
+          <p:cNvSpPr>
+            <a:spLocks noGrp="1"/>
+          </p:cNvSpPr>
+          <p:nvPr>
+            <p:ph type="title"/>
+          </p:nvPr>
+        </p:nvSpPr>
+        <p:spPr>
+          <a:xfrm>
+            <a:off x="1144371" y="-35439"/>
+            <a:ext cx="7548179" cy="560552"/>
+          </a:xfrm>
+        </p:spPr>
+        <p:txBody>
+          <a:bodyPr>
+            <a:normAutofit/>
+          </a:bodyPr>
+          <a:lstStyle/>
+          <a:p>
+            <a:pPr>
+              <a:lnSpc>
+                <a:spcPct val="90000"/>
+              </a:lnSpc>
+            </a:pPr>
+            <a:r>
+              <a:rPr lang="en-US" sz="3300" dirty="0"/>
+              <a:t>Databricks </a:t>
+            </a:r>
+            <a:r>
+              <a:rPr lang="en-US" sz="3300" dirty="0" err="1"/>
+              <a:t>Intregration</a:t>
+            </a:r>
+            <a:endParaRPr lang="en-US" sz="3300" dirty="0"/>
+          </a:p>
+        </p:txBody>
+      </p:sp>
+      <p:pic>
+        <p:nvPicPr>
+          <p:cNvPr id="6" name="Picture 5">
+            <a:extLst>
+              <a:ext uri="{FF2B5EF4-FFF2-40B4-BE49-F238E27FC236}">
+                <a16:creationId xmlns:a16="http://schemas.microsoft.com/office/drawing/2014/main" id="{491ECD3A-5CDE-20DA-7750-1D19DA03DAF6}"/>
+              </a:ext>
+            </a:extLst>
+          </p:cNvPr>
+          <p:cNvPicPr>
+            <a:picLocks noChangeAspect="1"/>
+          </p:cNvPicPr>
+          <p:nvPr/>
+        </p:nvPicPr>
+        <p:blipFill>
+          <a:blip r:embed="rId2"/>
+          <a:stretch>
+            <a:fillRect/>
+          </a:stretch>
+        </p:blipFill>
+        <p:spPr>
+          <a:xfrm>
+            <a:off x="891390" y="814771"/>
+            <a:ext cx="7371945" cy="3907131"/>
+          </a:xfrm>
+          <a:prstGeom prst="rect">
+            <a:avLst/>
+          </a:prstGeom>
+          <a:noFill/>
+        </p:spPr>
+      </p:pic>
+    </p:spTree>
+    <p:extLst>
+      <p:ext uri="{BB962C8B-B14F-4D97-AF65-F5344CB8AC3E}">
+        <p14:creationId xmlns:p14="http://schemas.microsoft.com/office/powerpoint/2010/main" val="433520698"/>
+      </p:ext>
+    </p:extLst>
+  </p:cSld>
+  <p:clrMapOvr>
+    <a:masterClrMapping/>
+  </p:clrMapOvr>
+</p:sld>
+</file>
+
+<file path=ppt/slides/slide15.xml><?xml version="1.0" encoding="utf-8"?>
+<p:sld xmlns:a="http://schemas.openxmlformats.org/drawingml/2006/main" xmlns:r="http://schemas.openxmlformats.org/officeDocument/2006/relationships" xmlns:p="http://schemas.openxmlformats.org/presentationml/2006/main">
+  <p:cSld>
+    <p:spTree>
+      <p:nvGrpSpPr>
+        <p:cNvPr id="1" name=""/>
+        <p:cNvGrpSpPr/>
+        <p:nvPr/>
+      </p:nvGrpSpPr>
+      <p:grpSpPr>
+        <a:xfrm>
+          <a:off x="0" y="0"/>
+          <a:ext cx="0" cy="0"/>
+          <a:chOff x="0" y="0"/>
+          <a:chExt cx="0" cy="0"/>
+        </a:xfrm>
+      </p:grpSpPr>
+      <p:sp>
+        <p:nvSpPr>
+          <p:cNvPr id="2" name="Title 1">
+            <a:extLst>
+              <a:ext uri="{FF2B5EF4-FFF2-40B4-BE49-F238E27FC236}">
+                <a16:creationId xmlns:a16="http://schemas.microsoft.com/office/drawing/2014/main" id="{28837941-31DF-111A-672B-45A257422520}"/>
+              </a:ext>
+            </a:extLst>
+          </p:cNvPr>
+          <p:cNvSpPr>
+            <a:spLocks noGrp="1"/>
+          </p:cNvSpPr>
+          <p:nvPr>
+            <p:ph type="title"/>
+          </p:nvPr>
+        </p:nvSpPr>
+        <p:spPr>
+          <a:xfrm>
+            <a:off x="1144371" y="-35439"/>
+            <a:ext cx="7548179" cy="560552"/>
+          </a:xfrm>
+        </p:spPr>
+        <p:txBody>
+          <a:bodyPr>
+            <a:normAutofit/>
+          </a:bodyPr>
+          <a:lstStyle/>
+          <a:p>
+            <a:pPr>
+              <a:lnSpc>
+                <a:spcPct val="90000"/>
+              </a:lnSpc>
+            </a:pPr>
+            <a:r>
+              <a:rPr lang="en-US" sz="3300" dirty="0"/>
+              <a:t>Databricks Marketing Pitch</a:t>
+            </a:r>
+          </a:p>
+        </p:txBody>
+      </p:sp>
+      <p:pic>
+        <p:nvPicPr>
+          <p:cNvPr id="4" name="Picture 3">
+            <a:extLst>
+              <a:ext uri="{FF2B5EF4-FFF2-40B4-BE49-F238E27FC236}">
+                <a16:creationId xmlns:a16="http://schemas.microsoft.com/office/drawing/2014/main" id="{0DA84872-587E-5295-F33F-D70A116784F3}"/>
+              </a:ext>
+            </a:extLst>
+          </p:cNvPr>
+          <p:cNvPicPr>
+            <a:picLocks noChangeAspect="1"/>
+          </p:cNvPicPr>
+          <p:nvPr/>
+        </p:nvPicPr>
+        <p:blipFill>
+          <a:blip r:embed="rId2"/>
+          <a:stretch>
+            <a:fillRect/>
+          </a:stretch>
+        </p:blipFill>
+        <p:spPr>
+          <a:xfrm>
+            <a:off x="1937663" y="656016"/>
+            <a:ext cx="5268673" cy="4315098"/>
+          </a:xfrm>
+          <a:prstGeom prst="rect">
+            <a:avLst/>
+          </a:prstGeom>
+        </p:spPr>
+      </p:pic>
+    </p:spTree>
+    <p:extLst>
+      <p:ext uri="{BB962C8B-B14F-4D97-AF65-F5344CB8AC3E}">
+        <p14:creationId xmlns:p14="http://schemas.microsoft.com/office/powerpoint/2010/main" val="306774486"/>
+      </p:ext>
+    </p:extLst>
+  </p:cSld>
+  <p:clrMapOvr>
+    <a:masterClrMapping/>
+  </p:clrMapOvr>
+</p:sld>
+</file>
+
+<file path=ppt/slides/slide16.xml><?xml version="1.0" encoding="utf-8"?>
+<p:sld xmlns:a="http://schemas.openxmlformats.org/drawingml/2006/main" xmlns:r="http://schemas.openxmlformats.org/officeDocument/2006/relationships" xmlns:p="http://schemas.openxmlformats.org/presentationml/2006/main">
+  <p:cSld>
+    <p:spTree>
+      <p:nvGrpSpPr>
+        <p:cNvPr id="1" name=""/>
+        <p:cNvGrpSpPr/>
+        <p:nvPr/>
+      </p:nvGrpSpPr>
+      <p:grpSpPr>
+        <a:xfrm>
+          <a:off x="0" y="0"/>
+          <a:ext cx="0" cy="0"/>
+          <a:chOff x="0" y="0"/>
+          <a:chExt cx="0" cy="0"/>
+        </a:xfrm>
+      </p:grpSpPr>
+      <p:sp>
+        <p:nvSpPr>
+          <p:cNvPr id="2" name="Title 1">
+            <a:extLst>
+              <a:ext uri="{FF2B5EF4-FFF2-40B4-BE49-F238E27FC236}">
                 <a16:creationId xmlns:a16="http://schemas.microsoft.com/office/drawing/2014/main" id="{9499EFF8-D9AC-F84D-8949-EF6A66C51733}"/>
               </a:ext>
             </a:extLst>
@@ -6509,12 +7129,6 @@
           <a:p>
             <a:r>
               <a:rPr lang="en-US" dirty="0"/>
-              <a:t>Principal Author, Pluralsight</a:t>
-            </a:r>
-          </a:p>
-          <a:p>
-            <a:r>
-              <a:rPr lang="en-US" dirty="0"/>
               <a:t>Based in Nashville, TN, US</a:t>
             </a:r>
           </a:p>
@@ -6527,13 +7141,13 @@
           <a:p>
             <a:r>
               <a:rPr lang="en-US" dirty="0"/>
-              <a:t>6-year Microsoft MVP in Azure AI</a:t>
+              <a:t>6-year Microsoft Most Valuable Professional (MVP) in Azure AI and Cloud &amp; Datacenter Management</a:t>
             </a:r>
           </a:p>
           <a:p>
             <a:r>
               <a:rPr lang="en-US" dirty="0"/>
-              <a:t>Email: </a:t>
+              <a:t>Connect: </a:t>
             </a:r>
             <a:r>
               <a:rPr lang="en-US" b="1" dirty="0">
@@ -6541,21 +7155,7 @@
                   <a:srgbClr val="0070C0"/>
                 </a:solidFill>
               </a:rPr>
-              <a:t>tim-warner@pluralsight.com</a:t>
-            </a:r>
-          </a:p>
-          <a:p>
-            <a:r>
-              <a:rPr lang="en-US" dirty="0"/>
-              <a:t>Badge: </a:t>
-            </a:r>
-            <a:r>
-              <a:rPr lang="en-US" b="1" dirty="0">
-                <a:solidFill>
-                  <a:srgbClr val="0070C0"/>
-                </a:solidFill>
-              </a:rPr>
-              <a:t>TechTrainerTim.com</a:t>
+              <a:t>timw.info/li</a:t>
             </a:r>
           </a:p>
         </p:txBody>
@@ -7044,7 +7644,7 @@
           <a:p>
             <a:r>
               <a:rPr lang="en-US" dirty="0"/>
-              <a:t>Break Schedule (CT, Nashville, TN)</a:t>
+              <a:t>Break Schedule (EDT)</a:t>
             </a:r>
           </a:p>
         </p:txBody>
@@ -7076,37 +7676,37 @@
           <a:lstStyle/>
           <a:p>
             <a:r>
-              <a:rPr lang="en-US" dirty="0"/>
-              <a:t>07:00am  -  Start (Identity &amp; Governance)</a:t>
-            </a:r>
-          </a:p>
-          <a:p>
-            <a:r>
-              <a:rPr lang="en-US" dirty="0"/>
-              <a:t>08:00am  -  8-min break (Data storage)</a:t>
-            </a:r>
-          </a:p>
-          <a:p>
-            <a:r>
-              <a:rPr lang="en-US" dirty="0"/>
-              <a:t>09:00am  -  8-min Break (Business Continuity)</a:t>
-            </a:r>
-          </a:p>
-          <a:p>
-            <a:r>
-              <a:rPr lang="en-US" dirty="0"/>
-              <a:t>10:00am  -  8-min Break (Infrastructure)</a:t>
-            </a:r>
-          </a:p>
-          <a:p>
-            <a:r>
-              <a:rPr lang="en-US" dirty="0"/>
-              <a:t>11:00am  -  8-min Break (Loose ends + cert focus)</a:t>
-            </a:r>
-          </a:p>
-          <a:p>
-            <a:r>
-              <a:rPr lang="en-US" dirty="0"/>
+              <a:rPr lang="en-US" sz="2400" dirty="0"/>
+              <a:t>07:00am  -  Start </a:t>
+            </a:r>
+          </a:p>
+          <a:p>
+            <a:r>
+              <a:rPr lang="en-US" sz="2400" dirty="0"/>
+              <a:t>08:00am  -  8-min break</a:t>
+            </a:r>
+          </a:p>
+          <a:p>
+            <a:r>
+              <a:rPr lang="en-US" sz="2400" dirty="0"/>
+              <a:t>09:00am  -  8-min Break</a:t>
+            </a:r>
+          </a:p>
+          <a:p>
+            <a:r>
+              <a:rPr lang="en-US" sz="2400" dirty="0"/>
+              <a:t>10:00am  -  8-min Break</a:t>
+            </a:r>
+          </a:p>
+          <a:p>
+            <a:r>
+              <a:rPr lang="en-US" sz="2400" dirty="0"/>
+              <a:t>11:00am  -  8-min Break</a:t>
+            </a:r>
+          </a:p>
+          <a:p>
+            <a:r>
+              <a:rPr lang="en-US" sz="2400" dirty="0"/>
               <a:t>12:00pm  -  Finish</a:t>
             </a:r>
           </a:p>

</xml_diff>